<commit_message>
one picure was missing
</commit_message>
<xml_diff>
--- a/Final/Presentation/Data_Visualization_Final.pptx
+++ b/Final/Presentation/Data_Visualization_Final.pptx
@@ -2375,8 +2375,8 @@
         </p:nvSpPr>
         <p:spPr>
           <a:xfrm>
-            <a:off x="838080" y="365040"/>
-            <a:ext cx="10514880" cy="1325160"/>
+            <a:off x="609480" y="273600"/>
+            <a:ext cx="10972080" cy="1144800"/>
           </a:xfrm>
           <a:prstGeom prst="rect">
             <a:avLst/>
@@ -2408,7 +2408,7 @@
         <p:spPr>
           <a:xfrm>
             <a:off x="609480" y="1604520"/>
-            <a:ext cx="10972440" cy="3977280"/>
+            <a:ext cx="10972080" cy="3976920"/>
           </a:xfrm>
           <a:prstGeom prst="rect">
             <a:avLst/>
@@ -2423,7 +2423,7 @@
               <a:buChar char=""/>
             </a:pPr>
             <a:r>
-              <a:rPr lang="en-US" sz="3200">
+              <a:rPr lang="en-US">
                 <a:latin typeface="Arial"/>
               </a:rPr>
               <a:t>Click to edit the outline text format</a:t>
@@ -2437,7 +2437,7 @@
               <a:buChar char=""/>
             </a:pPr>
             <a:r>
-              <a:rPr lang="en-US" sz="2800">
+              <a:rPr lang="en-US">
                 <a:latin typeface="Arial"/>
               </a:rPr>
               <a:t>Second Outline Level</a:t>
@@ -2451,7 +2451,7 @@
               <a:buChar char=""/>
             </a:pPr>
             <a:r>
-              <a:rPr lang="en-US" sz="2400">
+              <a:rPr lang="en-US">
                 <a:latin typeface="Arial"/>
               </a:rPr>
               <a:t>Third Outline Level</a:t>
@@ -2465,7 +2465,7 @@
               <a:buChar char=""/>
             </a:pPr>
             <a:r>
-              <a:rPr lang="en-US" sz="2000">
+              <a:rPr lang="en-US">
                 <a:latin typeface="Arial"/>
               </a:rPr>
               <a:t>Fourth Outline Level</a:t>
@@ -2479,7 +2479,7 @@
               <a:buChar char=""/>
             </a:pPr>
             <a:r>
-              <a:rPr lang="en-US" sz="2000">
+              <a:rPr lang="en-US">
                 <a:latin typeface="Arial"/>
               </a:rPr>
               <a:t>Fifth Outline Level</a:t>
@@ -2493,7 +2493,7 @@
               <a:buChar char=""/>
             </a:pPr>
             <a:r>
-              <a:rPr lang="en-US" sz="2000">
+              <a:rPr lang="en-US">
                 <a:latin typeface="Arial"/>
               </a:rPr>
               <a:t>Sixth Outline Level</a:t>
@@ -2507,7 +2507,7 @@
               <a:buChar char=""/>
             </a:pPr>
             <a:r>
-              <a:rPr lang="en-US" sz="2000">
+              <a:rPr lang="en-US">
                 <a:latin typeface="Arial"/>
               </a:rPr>
               <a:t>Seventh Outline Level</a:t>
@@ -2760,7 +2760,7 @@
         <p:spPr>
           <a:xfrm>
             <a:off x="1523880" y="0"/>
-            <a:ext cx="9143280" cy="1599480"/>
+            <a:ext cx="9142920" cy="1599120"/>
           </a:xfrm>
           <a:prstGeom prst="rect">
             <a:avLst/>
@@ -2800,7 +2800,7 @@
         <p:spPr>
           <a:xfrm>
             <a:off x="1359000" y="1600200"/>
-            <a:ext cx="9143280" cy="1654920"/>
+            <a:ext cx="9142920" cy="1654560"/>
           </a:xfrm>
           <a:prstGeom prst="rect">
             <a:avLst/>
@@ -2846,7 +2846,7 @@
         <p:spPr>
           <a:xfrm>
             <a:off x="4336920" y="2584440"/>
-            <a:ext cx="3517200" cy="3517200"/>
+            <a:ext cx="3516840" cy="3516840"/>
           </a:xfrm>
           <a:prstGeom prst="rect">
             <a:avLst/>
@@ -2907,7 +2907,7 @@
       </p:grpSpPr>
       <p:pic>
         <p:nvPicPr>
-          <p:cNvPr id="114" name="Picture 4" descr=""/>
+          <p:cNvPr id="115" name="Picture 4" descr=""/>
           <p:cNvPicPr/>
           <p:nvPr/>
         </p:nvPicPr>
@@ -2920,7 +2920,7 @@
         <p:spPr>
           <a:xfrm>
             <a:off x="1278720" y="0"/>
-            <a:ext cx="9707400" cy="6857280"/>
+            <a:ext cx="9707040" cy="6856920"/>
           </a:xfrm>
           <a:prstGeom prst="rect">
             <a:avLst/>
@@ -2981,14 +2981,14 @@
       </p:grpSpPr>
       <p:sp>
         <p:nvSpPr>
-          <p:cNvPr id="115" name="CustomShape 1"/>
+          <p:cNvPr id="116" name="CustomShape 1"/>
           <p:cNvSpPr/>
           <p:nvPr/>
         </p:nvSpPr>
         <p:spPr>
           <a:xfrm>
             <a:off x="1625760" y="1079640"/>
-            <a:ext cx="8965440" cy="3503520"/>
+            <a:ext cx="8965080" cy="3503160"/>
           </a:xfrm>
           <a:prstGeom prst="rect">
             <a:avLst/>
@@ -3102,7 +3102,7 @@
         <p:spPr>
           <a:xfrm>
             <a:off x="838080" y="365040"/>
-            <a:ext cx="10514880" cy="1324800"/>
+            <a:ext cx="10514520" cy="1324440"/>
           </a:xfrm>
           <a:prstGeom prst="rect">
             <a:avLst/>
@@ -3148,7 +3148,7 @@
         <p:spPr>
           <a:xfrm>
             <a:off x="1645920" y="2979720"/>
-            <a:ext cx="3285360" cy="2323440"/>
+            <a:ext cx="3285000" cy="2323080"/>
           </a:xfrm>
           <a:prstGeom prst="rect">
             <a:avLst/>
@@ -3173,7 +3173,7 @@
         <p:spPr>
           <a:xfrm>
             <a:off x="6952680" y="2468880"/>
-            <a:ext cx="3745440" cy="3217320"/>
+            <a:ext cx="3745080" cy="3216960"/>
           </a:xfrm>
           <a:prstGeom prst="rect">
             <a:avLst/>
@@ -3241,7 +3241,7 @@
         <p:spPr>
           <a:xfrm>
             <a:off x="731880" y="0"/>
-            <a:ext cx="10514880" cy="1324800"/>
+            <a:ext cx="10514520" cy="1324440"/>
           </a:xfrm>
           <a:prstGeom prst="rect">
             <a:avLst/>
@@ -3277,7 +3277,7 @@
         </p:nvGraphicFramePr>
         <p:xfrm>
           <a:off x="731520" y="3200400"/>
-          <a:ext cx="10806840" cy="2914920"/>
+          <a:ext cx="10806480" cy="2914560"/>
         </p:xfrm>
         <a:graphic>
           <a:graphicData uri="http://schemas.openxmlformats.org/drawingml/2006/table">
@@ -3291,7 +3291,7 @@
                 <a:gridCol w="1350000"/>
                 <a:gridCol w="1350000"/>
                 <a:gridCol w="1350000"/>
-                <a:gridCol w="1357200"/>
+                <a:gridCol w="1356480"/>
               </a:tblGrid>
               <a:tr h="431640">
                 <a:tc>
@@ -4396,7 +4396,7 @@
         <p:spPr>
           <a:xfrm>
             <a:off x="697680" y="2834640"/>
-            <a:ext cx="5428440" cy="364320"/>
+            <a:ext cx="5428080" cy="363960"/>
           </a:xfrm>
           <a:prstGeom prst="rect">
             <a:avLst/>
@@ -4435,7 +4435,7 @@
         </p:nvPicPr>
         <p:blipFill>
           <a:blip r:embed="rId1"/>
-          <a:srcRect l="0" t="-1139192" r="0" b="-7162131"/>
+          <a:srcRect l="0" t="642776" r="0" b="-4797105"/>
           <a:stretch>
             <a:fillRect/>
           </a:stretch>
@@ -4443,7 +4443,7 @@
         <p:spPr>
           <a:xfrm>
             <a:off x="2834640" y="1191240"/>
-            <a:ext cx="5999040" cy="1104120"/>
+            <a:ext cx="5998680" cy="1103760"/>
           </a:xfrm>
           <a:prstGeom prst="rect">
             <a:avLst/>
@@ -4462,7 +4462,7 @@
         <p:spPr>
           <a:xfrm>
             <a:off x="3403080" y="2271960"/>
-            <a:ext cx="5955480" cy="288000"/>
+            <a:ext cx="5955120" cy="287640"/>
           </a:xfrm>
           <a:prstGeom prst="rect">
             <a:avLst/>
@@ -4493,6 +4493,32 @@
           </a:p>
         </p:txBody>
       </p:sp>
+      <p:pic>
+        <p:nvPicPr>
+          <p:cNvPr id="83" name="Picture 3" descr=""/>
+          <p:cNvPicPr/>
+          <p:nvPr/>
+        </p:nvPicPr>
+        <p:blipFill>
+          <a:blip r:embed="rId2"/>
+          <a:srcRect l="0" t="1120430" r="0" b="892831"/>
+          <a:stretch>
+            <a:fillRect/>
+          </a:stretch>
+        </p:blipFill>
+        <p:spPr>
+          <a:xfrm>
+            <a:off x="2833920" y="1097280"/>
+            <a:ext cx="5999400" cy="1104480"/>
+          </a:xfrm>
+          <a:prstGeom prst="rect">
+            <a:avLst/>
+          </a:prstGeom>
+          <a:ln>
+            <a:noFill/>
+          </a:ln>
+        </p:spPr>
+      </p:pic>
     </p:spTree>
   </p:cSld>
   <p:timing>
@@ -4544,7 +4570,7 @@
       </p:grpSpPr>
       <p:pic>
         <p:nvPicPr>
-          <p:cNvPr id="83" name="Picture 5" descr=""/>
+          <p:cNvPr id="84" name="Picture 5" descr=""/>
           <p:cNvPicPr/>
           <p:nvPr/>
         </p:nvPicPr>
@@ -4557,7 +4583,7 @@
         <p:spPr>
           <a:xfrm>
             <a:off x="457200" y="2812680"/>
-            <a:ext cx="4120560" cy="3084480"/>
+            <a:ext cx="4120200" cy="3084120"/>
           </a:xfrm>
           <a:prstGeom prst="rect">
             <a:avLst/>
@@ -4569,14 +4595,14 @@
       </p:pic>
       <p:sp>
         <p:nvSpPr>
-          <p:cNvPr id="84" name="CustomShape 1"/>
+          <p:cNvPr id="85" name="CustomShape 1"/>
           <p:cNvSpPr/>
           <p:nvPr/>
         </p:nvSpPr>
         <p:spPr>
           <a:xfrm>
             <a:off x="399960" y="5898240"/>
-            <a:ext cx="4177440" cy="486000"/>
+            <a:ext cx="4177080" cy="485640"/>
           </a:xfrm>
           <a:prstGeom prst="rect">
             <a:avLst/>
@@ -4609,7 +4635,7 @@
       </p:sp>
       <p:pic>
         <p:nvPicPr>
-          <p:cNvPr id="85" name="Content Placeholder 3" descr=""/>
+          <p:cNvPr id="86" name="Content Placeholder 3" descr=""/>
           <p:cNvPicPr/>
           <p:nvPr/>
         </p:nvPicPr>
@@ -4622,7 +4648,7 @@
         <p:spPr>
           <a:xfrm>
             <a:off x="6750360" y="3017160"/>
-            <a:ext cx="5008680" cy="3674880"/>
+            <a:ext cx="5008320" cy="3674520"/>
           </a:xfrm>
           <a:prstGeom prst="rect">
             <a:avLst/>
@@ -4634,14 +4660,14 @@
       </p:pic>
       <p:sp>
         <p:nvSpPr>
-          <p:cNvPr id="86" name="CustomShape 2"/>
+          <p:cNvPr id="87" name="CustomShape 2"/>
           <p:cNvSpPr/>
           <p:nvPr/>
         </p:nvSpPr>
         <p:spPr>
           <a:xfrm>
             <a:off x="5372280" y="3416400"/>
-            <a:ext cx="1015200" cy="964440"/>
+            <a:ext cx="1014840" cy="964080"/>
           </a:xfrm>
           <a:prstGeom prst="rightArrow">
             <a:avLst>
@@ -4662,14 +4688,14 @@
       </p:sp>
       <p:sp>
         <p:nvSpPr>
-          <p:cNvPr id="87" name="CustomShape 3"/>
+          <p:cNvPr id="88" name="CustomShape 3"/>
           <p:cNvSpPr/>
           <p:nvPr/>
         </p:nvSpPr>
         <p:spPr>
           <a:xfrm>
             <a:off x="399960" y="2443680"/>
-            <a:ext cx="5428440" cy="364320"/>
+            <a:ext cx="5428080" cy="363960"/>
           </a:xfrm>
           <a:prstGeom prst="rect">
             <a:avLst/>
@@ -4702,14 +4728,14 @@
       </p:sp>
       <p:sp>
         <p:nvSpPr>
-          <p:cNvPr id="88" name="CustomShape 4"/>
+          <p:cNvPr id="89" name="CustomShape 4"/>
           <p:cNvSpPr/>
           <p:nvPr/>
         </p:nvSpPr>
         <p:spPr>
           <a:xfrm>
             <a:off x="6762600" y="2478240"/>
-            <a:ext cx="5428440" cy="364320"/>
+            <a:ext cx="5428080" cy="363960"/>
           </a:xfrm>
           <a:prstGeom prst="rect">
             <a:avLst/>
@@ -4742,14 +4768,14 @@
       </p:sp>
       <p:sp>
         <p:nvSpPr>
-          <p:cNvPr id="89" name="CustomShape 5"/>
+          <p:cNvPr id="90" name="CustomShape 5"/>
           <p:cNvSpPr/>
           <p:nvPr/>
         </p:nvSpPr>
         <p:spPr>
           <a:xfrm>
             <a:off x="762480" y="360"/>
-            <a:ext cx="10514880" cy="1324800"/>
+            <a:ext cx="10514520" cy="1324440"/>
           </a:xfrm>
           <a:prstGeom prst="rect">
             <a:avLst/>
@@ -4831,14 +4857,14 @@
       </p:grpSpPr>
       <p:sp>
         <p:nvSpPr>
-          <p:cNvPr id="90" name="CustomShape 1"/>
+          <p:cNvPr id="91" name="CustomShape 1"/>
           <p:cNvSpPr/>
           <p:nvPr/>
         </p:nvSpPr>
         <p:spPr>
           <a:xfrm>
             <a:off x="762120" y="0"/>
-            <a:ext cx="10514880" cy="1324800"/>
+            <a:ext cx="10514520" cy="1324440"/>
           </a:xfrm>
           <a:prstGeom prst="rect">
             <a:avLst/>
@@ -4871,7 +4897,7 @@
       </p:sp>
       <p:pic>
         <p:nvPicPr>
-          <p:cNvPr id="91" name="Picture 6" descr=""/>
+          <p:cNvPr id="92" name="Picture 6" descr=""/>
           <p:cNvPicPr/>
           <p:nvPr/>
         </p:nvPicPr>
@@ -4884,7 +4910,7 @@
         <p:spPr>
           <a:xfrm>
             <a:off x="7340760" y="1993320"/>
-            <a:ext cx="4215240" cy="4215240"/>
+            <a:ext cx="4214880" cy="4214880"/>
           </a:xfrm>
           <a:prstGeom prst="rect">
             <a:avLst/>
@@ -4896,14 +4922,14 @@
       </p:pic>
       <p:sp>
         <p:nvSpPr>
-          <p:cNvPr id="92" name="CustomShape 2"/>
+          <p:cNvPr id="93" name="CustomShape 2"/>
           <p:cNvSpPr/>
           <p:nvPr/>
         </p:nvSpPr>
         <p:spPr>
           <a:xfrm>
             <a:off x="7308720" y="1140840"/>
-            <a:ext cx="4647600" cy="912240"/>
+            <a:ext cx="4647240" cy="911880"/>
           </a:xfrm>
           <a:prstGeom prst="rect">
             <a:avLst/>
@@ -4936,14 +4962,14 @@
       </p:sp>
       <p:sp>
         <p:nvSpPr>
-          <p:cNvPr id="93" name="CustomShape 3"/>
+          <p:cNvPr id="94" name="CustomShape 3"/>
           <p:cNvSpPr/>
           <p:nvPr/>
         </p:nvSpPr>
         <p:spPr>
           <a:xfrm>
             <a:off x="7551720" y="6217920"/>
-            <a:ext cx="4152240" cy="486000"/>
+            <a:ext cx="4151880" cy="485640"/>
           </a:xfrm>
           <a:prstGeom prst="rect">
             <a:avLst/>
@@ -4976,7 +5002,7 @@
       </p:sp>
       <p:pic>
         <p:nvPicPr>
-          <p:cNvPr id="94" name="Picture 5" descr=""/>
+          <p:cNvPr id="95" name="Picture 5" descr=""/>
           <p:cNvPicPr/>
           <p:nvPr/>
         </p:nvPicPr>
@@ -4989,7 +5015,7 @@
         <p:spPr>
           <a:xfrm>
             <a:off x="490680" y="2842560"/>
-            <a:ext cx="4120560" cy="3084480"/>
+            <a:ext cx="4120200" cy="3084120"/>
           </a:xfrm>
           <a:prstGeom prst="rect">
             <a:avLst/>
@@ -5001,14 +5027,14 @@
       </p:pic>
       <p:sp>
         <p:nvSpPr>
-          <p:cNvPr id="95" name="CustomShape 4"/>
+          <p:cNvPr id="96" name="CustomShape 4"/>
           <p:cNvSpPr/>
           <p:nvPr/>
         </p:nvSpPr>
         <p:spPr>
           <a:xfrm>
             <a:off x="433440" y="5928120"/>
-            <a:ext cx="4177440" cy="486000"/>
+            <a:ext cx="4177080" cy="485640"/>
           </a:xfrm>
           <a:prstGeom prst="rect">
             <a:avLst/>
@@ -5041,14 +5067,14 @@
       </p:sp>
       <p:sp>
         <p:nvSpPr>
-          <p:cNvPr id="96" name="CustomShape 5"/>
+          <p:cNvPr id="97" name="CustomShape 5"/>
           <p:cNvSpPr/>
           <p:nvPr/>
         </p:nvSpPr>
         <p:spPr>
           <a:xfrm>
             <a:off x="5405760" y="3446280"/>
-            <a:ext cx="1015200" cy="964440"/>
+            <a:ext cx="1014840" cy="964080"/>
           </a:xfrm>
           <a:prstGeom prst="rightArrow">
             <a:avLst>
@@ -5069,14 +5095,14 @@
       </p:sp>
       <p:sp>
         <p:nvSpPr>
-          <p:cNvPr id="97" name="CustomShape 6"/>
+          <p:cNvPr id="98" name="CustomShape 6"/>
           <p:cNvSpPr/>
           <p:nvPr/>
         </p:nvSpPr>
         <p:spPr>
           <a:xfrm>
             <a:off x="433440" y="2473560"/>
-            <a:ext cx="5428440" cy="364320"/>
+            <a:ext cx="5428080" cy="363960"/>
           </a:xfrm>
           <a:prstGeom prst="rect">
             <a:avLst/>
@@ -5158,14 +5184,14 @@
       </p:grpSpPr>
       <p:sp>
         <p:nvSpPr>
-          <p:cNvPr id="98" name="CustomShape 1"/>
+          <p:cNvPr id="99" name="CustomShape 1"/>
           <p:cNvSpPr/>
           <p:nvPr/>
         </p:nvSpPr>
         <p:spPr>
           <a:xfrm>
             <a:off x="0" y="0"/>
-            <a:ext cx="12191400" cy="1324800"/>
+            <a:ext cx="12191040" cy="1324440"/>
           </a:xfrm>
           <a:prstGeom prst="rect">
             <a:avLst/>
@@ -5198,13 +5224,13 @@
       </p:sp>
       <p:pic>
         <p:nvPicPr>
-          <p:cNvPr id="99" name="Picture 3" descr=""/>
+          <p:cNvPr id="100" name="Picture 3" descr=""/>
           <p:cNvPicPr/>
           <p:nvPr/>
         </p:nvPicPr>
         <p:blipFill>
           <a:blip r:embed="rId1"/>
-          <a:srcRect l="0" t="0" r="0" b="39112"/>
+          <a:srcRect l="0" t="0" r="0" b="39105"/>
           <a:stretch>
             <a:fillRect/>
           </a:stretch>
@@ -5212,7 +5238,7 @@
         <p:spPr>
           <a:xfrm>
             <a:off x="0" y="1033200"/>
-            <a:ext cx="12191400" cy="3042720"/>
+            <a:ext cx="12191040" cy="3042360"/>
           </a:xfrm>
           <a:prstGeom prst="rect">
             <a:avLst/>
@@ -5224,7 +5250,7 @@
       </p:pic>
       <p:pic>
         <p:nvPicPr>
-          <p:cNvPr id="100" name="Picture 4" descr=""/>
+          <p:cNvPr id="101" name="Picture 4" descr=""/>
           <p:cNvPicPr/>
           <p:nvPr/>
         </p:nvPicPr>
@@ -5236,8 +5262,8 @@
         </p:blipFill>
         <p:spPr>
           <a:xfrm rot="16200000">
-            <a:off x="2514600" y="3939480"/>
-            <a:ext cx="487080" cy="4303080"/>
+            <a:off x="2514600" y="3939840"/>
+            <a:ext cx="486720" cy="4302720"/>
           </a:xfrm>
           <a:prstGeom prst="rect">
             <a:avLst/>
@@ -5249,7 +5275,7 @@
       </p:pic>
       <p:pic>
         <p:nvPicPr>
-          <p:cNvPr id="101" name="Picture 5" descr=""/>
+          <p:cNvPr id="102" name="Picture 5" descr=""/>
           <p:cNvPicPr/>
           <p:nvPr/>
         </p:nvPicPr>
@@ -5262,7 +5288,7 @@
         <p:spPr>
           <a:xfrm>
             <a:off x="9582120" y="4092480"/>
-            <a:ext cx="996480" cy="2723400"/>
+            <a:ext cx="996120" cy="2723040"/>
           </a:xfrm>
           <a:prstGeom prst="rect">
             <a:avLst/>
@@ -5274,14 +5300,14 @@
       </p:pic>
       <p:sp>
         <p:nvSpPr>
-          <p:cNvPr id="102" name="CustomShape 2"/>
+          <p:cNvPr id="103" name="CustomShape 2"/>
           <p:cNvSpPr/>
           <p:nvPr/>
         </p:nvSpPr>
         <p:spPr>
           <a:xfrm>
             <a:off x="606960" y="5109840"/>
-            <a:ext cx="4408920" cy="638640"/>
+            <a:ext cx="4408560" cy="638280"/>
           </a:xfrm>
           <a:prstGeom prst="rect">
             <a:avLst/>
@@ -5314,14 +5340,14 @@
       </p:sp>
       <p:sp>
         <p:nvSpPr>
-          <p:cNvPr id="103" name="CustomShape 3"/>
+          <p:cNvPr id="104" name="CustomShape 3"/>
           <p:cNvSpPr/>
           <p:nvPr/>
         </p:nvSpPr>
         <p:spPr>
           <a:xfrm>
             <a:off x="6819840" y="4187880"/>
-            <a:ext cx="5193720" cy="638640"/>
+            <a:ext cx="5193360" cy="638280"/>
           </a:xfrm>
           <a:prstGeom prst="rect">
             <a:avLst/>
@@ -5403,14 +5429,14 @@
       </p:grpSpPr>
       <p:sp>
         <p:nvSpPr>
-          <p:cNvPr id="104" name="CustomShape 1"/>
+          <p:cNvPr id="105" name="CustomShape 1"/>
           <p:cNvSpPr/>
           <p:nvPr/>
         </p:nvSpPr>
         <p:spPr>
           <a:xfrm>
             <a:off x="0" y="-162360"/>
-            <a:ext cx="10514880" cy="1324800"/>
+            <a:ext cx="10514520" cy="1324440"/>
           </a:xfrm>
           <a:prstGeom prst="rect">
             <a:avLst/>
@@ -5443,13 +5469,13 @@
       </p:sp>
       <p:pic>
         <p:nvPicPr>
-          <p:cNvPr id="105" name="Picture 3" descr=""/>
+          <p:cNvPr id="106" name="Picture 3" descr=""/>
           <p:cNvPicPr/>
           <p:nvPr/>
         </p:nvPicPr>
         <p:blipFill>
           <a:blip r:embed="rId1"/>
-          <a:srcRect l="0" t="6759" r="0" b="44952"/>
+          <a:srcRect l="0" t="6752" r="0" b="44945"/>
           <a:stretch>
             <a:fillRect/>
           </a:stretch>
@@ -5457,7 +5483,7 @@
         <p:spPr>
           <a:xfrm>
             <a:off x="0" y="965160"/>
-            <a:ext cx="12191400" cy="2412360"/>
+            <a:ext cx="12191040" cy="2412000"/>
           </a:xfrm>
           <a:prstGeom prst="rect">
             <a:avLst/>
@@ -5469,14 +5495,14 @@
       </p:pic>
       <p:sp>
         <p:nvSpPr>
-          <p:cNvPr id="106" name="CustomShape 2"/>
+          <p:cNvPr id="107" name="CustomShape 2"/>
           <p:cNvSpPr/>
           <p:nvPr/>
         </p:nvSpPr>
         <p:spPr>
           <a:xfrm>
             <a:off x="10020240" y="581760"/>
-            <a:ext cx="2171160" cy="637920"/>
+            <a:ext cx="2170800" cy="637560"/>
           </a:xfrm>
           <a:prstGeom prst="rect">
             <a:avLst/>
@@ -5509,7 +5535,7 @@
       </p:sp>
       <p:pic>
         <p:nvPicPr>
-          <p:cNvPr id="107" name="Picture 5" descr=""/>
+          <p:cNvPr id="108" name="Picture 5" descr=""/>
           <p:cNvPicPr/>
           <p:nvPr/>
         </p:nvPicPr>
@@ -5522,7 +5548,7 @@
         <p:spPr>
           <a:xfrm>
             <a:off x="0" y="4162680"/>
-            <a:ext cx="8627760" cy="2694600"/>
+            <a:ext cx="8627400" cy="2694240"/>
           </a:xfrm>
           <a:prstGeom prst="rect">
             <a:avLst/>
@@ -5534,14 +5560,14 @@
       </p:pic>
       <p:sp>
         <p:nvSpPr>
-          <p:cNvPr id="108" name="CustomShape 3"/>
+          <p:cNvPr id="109" name="CustomShape 3"/>
           <p:cNvSpPr/>
           <p:nvPr/>
         </p:nvSpPr>
         <p:spPr>
           <a:xfrm>
             <a:off x="8801280" y="4307760"/>
-            <a:ext cx="3276000" cy="1460880"/>
+            <a:ext cx="3275640" cy="1460520"/>
           </a:xfrm>
           <a:prstGeom prst="rect">
             <a:avLst/>
@@ -5648,14 +5674,14 @@
       </p:grpSpPr>
       <p:sp>
         <p:nvSpPr>
-          <p:cNvPr id="109" name="CustomShape 1"/>
+          <p:cNvPr id="110" name="CustomShape 1"/>
           <p:cNvSpPr/>
           <p:nvPr/>
         </p:nvSpPr>
         <p:spPr>
           <a:xfrm>
             <a:off x="0" y="0"/>
-            <a:ext cx="12191400" cy="1324800"/>
+            <a:ext cx="12191040" cy="1324440"/>
           </a:xfrm>
           <a:prstGeom prst="rect">
             <a:avLst/>
@@ -5709,7 +5735,7 @@
       </p:sp>
       <p:pic>
         <p:nvPicPr>
-          <p:cNvPr id="110" name="Picture 5" descr=""/>
+          <p:cNvPr id="111" name="Picture 5" descr=""/>
           <p:cNvPicPr/>
           <p:nvPr/>
         </p:nvPicPr>
@@ -5722,7 +5748,7 @@
         <p:spPr>
           <a:xfrm>
             <a:off x="939960" y="1325520"/>
-            <a:ext cx="10311840" cy="5531760"/>
+            <a:ext cx="10311480" cy="5531400"/>
           </a:xfrm>
           <a:prstGeom prst="rect">
             <a:avLst/>
@@ -5783,13 +5809,13 @@
       </p:grpSpPr>
       <p:pic>
         <p:nvPicPr>
-          <p:cNvPr id="111" name="Picture 4" descr=""/>
+          <p:cNvPr id="112" name="Picture 4" descr=""/>
           <p:cNvPicPr/>
           <p:nvPr/>
         </p:nvPicPr>
         <p:blipFill>
           <a:blip r:embed="rId1"/>
-          <a:srcRect l="0" t="0" r="8271" b="0"/>
+          <a:srcRect l="0" t="0" r="8259" b="0"/>
           <a:stretch>
             <a:fillRect/>
           </a:stretch>
@@ -5797,7 +5823,7 @@
         <p:spPr>
           <a:xfrm>
             <a:off x="4273560" y="1512000"/>
-            <a:ext cx="7447680" cy="4825440"/>
+            <a:ext cx="7447320" cy="4825080"/>
           </a:xfrm>
           <a:prstGeom prst="rect">
             <a:avLst/>
@@ -5809,14 +5835,14 @@
       </p:pic>
       <p:sp>
         <p:nvSpPr>
-          <p:cNvPr id="112" name="CustomShape 1"/>
+          <p:cNvPr id="113" name="CustomShape 1"/>
           <p:cNvSpPr/>
           <p:nvPr/>
         </p:nvSpPr>
         <p:spPr>
           <a:xfrm>
             <a:off x="927000" y="0"/>
-            <a:ext cx="10397520" cy="1324800"/>
+            <a:ext cx="10397160" cy="1324440"/>
           </a:xfrm>
           <a:prstGeom prst="rect">
             <a:avLst/>
@@ -5849,14 +5875,14 @@
       </p:sp>
       <p:sp>
         <p:nvSpPr>
-          <p:cNvPr id="113" name="CustomShape 2"/>
+          <p:cNvPr id="114" name="CustomShape 2"/>
           <p:cNvSpPr/>
           <p:nvPr/>
         </p:nvSpPr>
         <p:spPr>
           <a:xfrm>
             <a:off x="88920" y="2031840"/>
-            <a:ext cx="3853800" cy="4478400"/>
+            <a:ext cx="3853440" cy="4478040"/>
           </a:xfrm>
           <a:prstGeom prst="rect">
             <a:avLst/>

</xml_diff>